<commit_message>
Update exercises and slides
</commit_message>
<xml_diff>
--- a/slides/Tag-2_5-Bestandteile_Resources.pptx
+++ b/slides/Tag-2_5-Bestandteile_Resources.pptx
@@ -4934,7 +4934,7 @@
               <a:pPr algn="ctr">
                 <a:defRPr/>
               </a:pPr>
-              <a:t>01.03.2020</a:t>
+              <a:t>05.08.2020</a:t>
             </a:fld>
             <a:endParaRPr lang="de-DE" sz="1000" dirty="0">
               <a:solidFill>
@@ -7178,6 +7178,16 @@
             <a:pPr marL="400050" lvl="1" indent="0">
               <a:buNone/>
             </a:pPr>
+            <a:r>
+              <a:rPr lang="de-DE" altLang="de-DE" sz="1400" dirty="0">
+                <a:solidFill>
+                  <a:srgbClr val="000000"/>
+                </a:solidFill>
+                <a:latin typeface="Consolas" panose="020B0609020204030204" pitchFamily="49" charset="0"/>
+                <a:cs typeface="Consolas" panose="020B0609020204030204" pitchFamily="49" charset="0"/>
+              </a:rPr>
+              <a:t/>
+            </a:r>
             <a:br>
               <a:rPr lang="de-DE" altLang="de-DE" sz="1400" dirty="0">
                 <a:solidFill>
@@ -7910,6 +7920,16 @@
                 <a:cs typeface="Consolas" panose="020B0609020204030204" pitchFamily="49" charset="0"/>
               </a:rPr>
             </a:br>
+            <a:r>
+              <a:rPr lang="de-DE" altLang="de-DE" sz="1200" dirty="0">
+                <a:solidFill>
+                  <a:srgbClr val="000000"/>
+                </a:solidFill>
+                <a:latin typeface="Consolas" panose="020B0609020204030204" pitchFamily="49" charset="0"/>
+                <a:cs typeface="Consolas" panose="020B0609020204030204" pitchFamily="49" charset="0"/>
+              </a:rPr>
+              <a:t/>
+            </a:r>
             <a:br>
               <a:rPr lang="de-DE" altLang="de-DE" sz="1200" dirty="0">
                 <a:solidFill>
@@ -7939,6 +7959,16 @@
               </a:rPr>
               <a:t>Override</a:t>
             </a:r>
+            <a:r>
+              <a:rPr lang="de-DE" altLang="de-DE" sz="1200" dirty="0">
+                <a:solidFill>
+                  <a:srgbClr val="000000"/>
+                </a:solidFill>
+                <a:latin typeface="Consolas" panose="020B0609020204030204" pitchFamily="49" charset="0"/>
+                <a:cs typeface="Consolas" panose="020B0609020204030204" pitchFamily="49" charset="0"/>
+              </a:rPr>
+              <a:t/>
+            </a:r>
             <a:br>
               <a:rPr lang="de-DE" altLang="de-DE" sz="1200" dirty="0">
                 <a:solidFill>
@@ -8304,6 +8334,16 @@
                 <a:cs typeface="Consolas" panose="020B0609020204030204" pitchFamily="49" charset="0"/>
               </a:rPr>
             </a:br>
+            <a:r>
+              <a:rPr lang="de-DE" altLang="de-DE" sz="1200" dirty="0">
+                <a:solidFill>
+                  <a:srgbClr val="000000"/>
+                </a:solidFill>
+                <a:latin typeface="Consolas" panose="020B0609020204030204" pitchFamily="49" charset="0"/>
+                <a:cs typeface="Consolas" panose="020B0609020204030204" pitchFamily="49" charset="0"/>
+              </a:rPr>
+              <a:t/>
+            </a:r>
             <a:br>
               <a:rPr lang="de-DE" altLang="de-DE" sz="1200" dirty="0">
                 <a:solidFill>
@@ -8437,6 +8477,16 @@
               </a:rPr>
               <a:t>Override</a:t>
             </a:r>
+            <a:r>
+              <a:rPr lang="de-DE" altLang="de-DE" sz="1200" dirty="0">
+                <a:solidFill>
+                  <a:srgbClr val="000000"/>
+                </a:solidFill>
+                <a:latin typeface="Consolas" panose="020B0609020204030204" pitchFamily="49" charset="0"/>
+                <a:cs typeface="Consolas" panose="020B0609020204030204" pitchFamily="49" charset="0"/>
+              </a:rPr>
+              <a:t/>
+            </a:r>
             <a:br>
               <a:rPr lang="de-DE" altLang="de-DE" sz="1200" dirty="0">
                 <a:solidFill>
@@ -8566,6 +8616,16 @@
               </a:rPr>
               <a:t>IOException</a:t>
             </a:r>
+            <a:r>
+              <a:rPr lang="de-DE" altLang="de-DE" sz="1200" dirty="0">
+                <a:solidFill>
+                  <a:srgbClr val="000000"/>
+                </a:solidFill>
+                <a:latin typeface="Consolas" panose="020B0609020204030204" pitchFamily="49" charset="0"/>
+                <a:cs typeface="Consolas" panose="020B0609020204030204" pitchFamily="49" charset="0"/>
+              </a:rPr>
+              <a:t/>
+            </a:r>
             <a:br>
               <a:rPr lang="de-DE" altLang="de-DE" sz="1200" dirty="0">
                 <a:solidFill>
@@ -8694,6 +8754,16 @@
               </a:rPr>
               <a:t>();</a:t>
             </a:r>
+            <a:r>
+              <a:rPr lang="de-DE" altLang="de-DE" sz="1200" dirty="0">
+                <a:solidFill>
+                  <a:srgbClr val="000000"/>
+                </a:solidFill>
+                <a:latin typeface="Consolas" panose="020B0609020204030204" pitchFamily="49" charset="0"/>
+                <a:cs typeface="Consolas" panose="020B0609020204030204" pitchFamily="49" charset="0"/>
+              </a:rPr>
+              <a:t/>
+            </a:r>
             <a:br>
               <a:rPr lang="de-DE" altLang="de-DE" sz="1200" dirty="0">
                 <a:solidFill>
@@ -9324,6 +9394,16 @@
                 <a:cs typeface="Consolas" panose="020B0609020204030204" pitchFamily="49" charset="0"/>
               </a:rPr>
             </a:br>
+            <a:r>
+              <a:rPr lang="de-DE" altLang="de-DE" sz="1200" dirty="0">
+                <a:solidFill>
+                  <a:srgbClr val="000000"/>
+                </a:solidFill>
+                <a:latin typeface="Consolas" panose="020B0609020204030204" pitchFamily="49" charset="0"/>
+                <a:cs typeface="Consolas" panose="020B0609020204030204" pitchFamily="49" charset="0"/>
+              </a:rPr>
+              <a:t/>
+            </a:r>
             <a:br>
               <a:rPr lang="de-DE" altLang="de-DE" sz="1200" dirty="0">
                 <a:solidFill>
@@ -9729,6 +9809,16 @@
             <a:pPr marL="0" lvl="0" indent="0">
               <a:buNone/>
             </a:pPr>
+            <a:r>
+              <a:rPr lang="de-DE" altLang="de-DE" sz="1600" i="1" dirty="0">
+                <a:solidFill>
+                  <a:srgbClr val="808080"/>
+                </a:solidFill>
+                <a:latin typeface="Consolas" panose="020B0609020204030204" pitchFamily="49" charset="0"/>
+                <a:cs typeface="Consolas" panose="020B0609020204030204" pitchFamily="49" charset="0"/>
+              </a:rPr>
+              <a:t/>
+            </a:r>
             <a:br>
               <a:rPr lang="de-DE" altLang="de-DE" sz="1600" i="1" dirty="0">
                 <a:solidFill>
@@ -9757,6 +9847,16 @@
                 <a:cs typeface="Consolas" panose="020B0609020204030204" pitchFamily="49" charset="0"/>
               </a:rPr>
               <a:t>Override</a:t>
+            </a:r>
+            <a:r>
+              <a:rPr lang="de-DE" altLang="de-DE" sz="1600" dirty="0">
+                <a:solidFill>
+                  <a:srgbClr val="000000"/>
+                </a:solidFill>
+                <a:latin typeface="Consolas" panose="020B0609020204030204" pitchFamily="49" charset="0"/>
+                <a:cs typeface="Consolas" panose="020B0609020204030204" pitchFamily="49" charset="0"/>
+              </a:rPr>
+              <a:t/>
             </a:r>
             <a:br>
               <a:rPr lang="de-DE" altLang="de-DE" sz="1600" dirty="0">
@@ -11065,6 +11165,16 @@
                 <a:cs typeface="Consolas" panose="020B0609020204030204" pitchFamily="49" charset="0"/>
               </a:rPr>
             </a:br>
+            <a:r>
+              <a:rPr lang="de-DE" altLang="de-DE" sz="1600" dirty="0">
+                <a:solidFill>
+                  <a:srgbClr val="000000"/>
+                </a:solidFill>
+                <a:latin typeface="Consolas" panose="020B0609020204030204" pitchFamily="49" charset="0"/>
+                <a:cs typeface="Consolas" panose="020B0609020204030204" pitchFamily="49" charset="0"/>
+              </a:rPr>
+              <a:t/>
+            </a:r>
             <a:br>
               <a:rPr lang="de-DE" altLang="de-DE" sz="1600" dirty="0">
                 <a:solidFill>
@@ -11133,6 +11243,16 @@
                 <a:cs typeface="Consolas" panose="020B0609020204030204" pitchFamily="49" charset="0"/>
               </a:rPr>
             </a:br>
+            <a:r>
+              <a:rPr lang="de-DE" altLang="de-DE" sz="1600" dirty="0">
+                <a:solidFill>
+                  <a:srgbClr val="000000"/>
+                </a:solidFill>
+                <a:latin typeface="Consolas" panose="020B0609020204030204" pitchFamily="49" charset="0"/>
+                <a:cs typeface="Consolas" panose="020B0609020204030204" pitchFamily="49" charset="0"/>
+              </a:rPr>
+              <a:t/>
+            </a:r>
             <a:br>
               <a:rPr lang="de-DE" altLang="de-DE" sz="1600" dirty="0">
                 <a:solidFill>
@@ -11181,6 +11301,16 @@
                 <a:cs typeface="Consolas" panose="020B0609020204030204" pitchFamily="49" charset="0"/>
               </a:rPr>
             </a:br>
+            <a:r>
+              <a:rPr lang="de-DE" altLang="de-DE" sz="1600" dirty="0">
+                <a:solidFill>
+                  <a:srgbClr val="000000"/>
+                </a:solidFill>
+                <a:latin typeface="Consolas" panose="020B0609020204030204" pitchFamily="49" charset="0"/>
+                <a:cs typeface="Consolas" panose="020B0609020204030204" pitchFamily="49" charset="0"/>
+              </a:rPr>
+              <a:t/>
+            </a:r>
             <a:br>
               <a:rPr lang="de-DE" altLang="de-DE" sz="1600" dirty="0">
                 <a:solidFill>
@@ -11437,6 +11567,16 @@
                 <a:cs typeface="Consolas" panose="020B0609020204030204" pitchFamily="49" charset="0"/>
               </a:rPr>
             </a:br>
+            <a:r>
+              <a:rPr lang="de-DE" altLang="de-DE" sz="1600" dirty="0">
+                <a:solidFill>
+                  <a:srgbClr val="000000"/>
+                </a:solidFill>
+                <a:latin typeface="Consolas" panose="020B0609020204030204" pitchFamily="49" charset="0"/>
+                <a:cs typeface="Consolas" panose="020B0609020204030204" pitchFamily="49" charset="0"/>
+              </a:rPr>
+              <a:t/>
+            </a:r>
             <a:br>
               <a:rPr lang="de-DE" altLang="de-DE" sz="1600" dirty="0">
                 <a:solidFill>
@@ -11485,6 +11625,16 @@
                 <a:cs typeface="Consolas" panose="020B0609020204030204" pitchFamily="49" charset="0"/>
               </a:rPr>
             </a:br>
+            <a:r>
+              <a:rPr lang="de-DE" altLang="de-DE" sz="1600" dirty="0">
+                <a:solidFill>
+                  <a:srgbClr val="000000"/>
+                </a:solidFill>
+                <a:latin typeface="Consolas" panose="020B0609020204030204" pitchFamily="49" charset="0"/>
+                <a:cs typeface="Consolas" panose="020B0609020204030204" pitchFamily="49" charset="0"/>
+              </a:rPr>
+              <a:t/>
+            </a:r>
             <a:br>
               <a:rPr lang="de-DE" altLang="de-DE" sz="1600" dirty="0">
                 <a:solidFill>
@@ -11741,6 +11891,16 @@
                 <a:cs typeface="Consolas" panose="020B0609020204030204" pitchFamily="49" charset="0"/>
               </a:rPr>
             </a:br>
+            <a:r>
+              <a:rPr lang="de-DE" altLang="de-DE" sz="1600" dirty="0">
+                <a:solidFill>
+                  <a:srgbClr val="000000"/>
+                </a:solidFill>
+                <a:latin typeface="Consolas" panose="020B0609020204030204" pitchFamily="49" charset="0"/>
+                <a:cs typeface="Consolas" panose="020B0609020204030204" pitchFamily="49" charset="0"/>
+              </a:rPr>
+              <a:t/>
+            </a:r>
             <a:br>
               <a:rPr lang="de-DE" altLang="de-DE" sz="1600" dirty="0">
                 <a:solidFill>
@@ -11888,6 +12048,16 @@
                 <a:cs typeface="Consolas" panose="020B0609020204030204" pitchFamily="49" charset="0"/>
               </a:rPr>
             </a:br>
+            <a:r>
+              <a:rPr lang="de-DE" altLang="de-DE" sz="1600" dirty="0">
+                <a:solidFill>
+                  <a:srgbClr val="000000"/>
+                </a:solidFill>
+                <a:latin typeface="Consolas" panose="020B0609020204030204" pitchFamily="49" charset="0"/>
+                <a:cs typeface="Consolas" panose="020B0609020204030204" pitchFamily="49" charset="0"/>
+              </a:rPr>
+              <a:t/>
+            </a:r>
             <a:br>
               <a:rPr lang="de-DE" altLang="de-DE" sz="1600" dirty="0">
                 <a:solidFill>
@@ -12501,6 +12671,16 @@
                 <a:cs typeface="Consolas" panose="020B0609020204030204" pitchFamily="49" charset="0"/>
               </a:rPr>
             </a:br>
+            <a:r>
+              <a:rPr lang="de-DE" altLang="de-DE" sz="1600" dirty="0">
+                <a:solidFill>
+                  <a:srgbClr val="000000"/>
+                </a:solidFill>
+                <a:latin typeface="Consolas" panose="020B0609020204030204" pitchFamily="49" charset="0"/>
+                <a:cs typeface="Consolas" panose="020B0609020204030204" pitchFamily="49" charset="0"/>
+              </a:rPr>
+              <a:t/>
+            </a:r>
             <a:br>
               <a:rPr lang="de-DE" altLang="de-DE" sz="1600" dirty="0">
                 <a:solidFill>
@@ -13024,523 +13204,689 @@
                 <a:cs typeface="Consolas" panose="020B0609020204030204" pitchFamily="49" charset="0"/>
               </a:rPr>
             </a:br>
-            <a:br>
-              <a:rPr lang="de-DE" altLang="de-DE" sz="1600" dirty="0">
-                <a:solidFill>
-                  <a:srgbClr val="000000"/>
-                </a:solidFill>
-                <a:latin typeface="Consolas" panose="020B0609020204030204" pitchFamily="49" charset="0"/>
-                <a:cs typeface="Consolas" panose="020B0609020204030204" pitchFamily="49" charset="0"/>
-              </a:rPr>
-            </a:br>
-            <a:r>
-              <a:rPr lang="de-DE" altLang="de-DE" sz="1600" dirty="0">
-                <a:solidFill>
-                  <a:srgbClr val="000000"/>
-                </a:solidFill>
-                <a:latin typeface="Consolas" panose="020B0609020204030204" pitchFamily="49" charset="0"/>
-                <a:cs typeface="Consolas" panose="020B0609020204030204" pitchFamily="49" charset="0"/>
-              </a:rPr>
-              <a:t>    @</a:t>
-            </a:r>
-            <a:r>
-              <a:rPr lang="de-DE" altLang="de-DE" sz="1600" dirty="0" err="1">
-                <a:solidFill>
-                  <a:srgbClr val="000000"/>
-                </a:solidFill>
-                <a:latin typeface="Consolas" panose="020B0609020204030204" pitchFamily="49" charset="0"/>
-                <a:cs typeface="Consolas" panose="020B0609020204030204" pitchFamily="49" charset="0"/>
-              </a:rPr>
-              <a:t>Override</a:t>
-            </a:r>
-            <a:br>
-              <a:rPr lang="de-DE" altLang="de-DE" sz="1600" dirty="0">
-                <a:solidFill>
-                  <a:srgbClr val="000000"/>
-                </a:solidFill>
-                <a:latin typeface="Consolas" panose="020B0609020204030204" pitchFamily="49" charset="0"/>
-                <a:cs typeface="Consolas" panose="020B0609020204030204" pitchFamily="49" charset="0"/>
-              </a:rPr>
-            </a:br>
-            <a:r>
-              <a:rPr lang="de-DE" altLang="de-DE" sz="1600" dirty="0">
-                <a:solidFill>
-                  <a:srgbClr val="000000"/>
-                </a:solidFill>
-                <a:latin typeface="Consolas" panose="020B0609020204030204" pitchFamily="49" charset="0"/>
-                <a:cs typeface="Consolas" panose="020B0609020204030204" pitchFamily="49" charset="0"/>
-              </a:rPr>
-              <a:t>    </a:t>
-            </a:r>
-            <a:r>
-              <a:rPr lang="de-DE" altLang="de-DE" sz="1600" b="1" dirty="0" err="1">
-                <a:solidFill>
-                  <a:srgbClr val="000080"/>
-                </a:solidFill>
-                <a:latin typeface="Consolas" panose="020B0609020204030204" pitchFamily="49" charset="0"/>
-                <a:cs typeface="Consolas" panose="020B0609020204030204" pitchFamily="49" charset="0"/>
-              </a:rPr>
-              <a:t>public</a:t>
-            </a:r>
-            <a:r>
-              <a:rPr lang="de-DE" altLang="de-DE" sz="1600" b="1" dirty="0">
-                <a:solidFill>
-                  <a:srgbClr val="000080"/>
-                </a:solidFill>
-                <a:latin typeface="Consolas" panose="020B0609020204030204" pitchFamily="49" charset="0"/>
-                <a:cs typeface="Consolas" panose="020B0609020204030204" pitchFamily="49" charset="0"/>
-              </a:rPr>
-              <a:t> </a:t>
-            </a:r>
-            <a:r>
-              <a:rPr lang="de-DE" altLang="de-DE" sz="1600" b="1" dirty="0" err="1">
-                <a:solidFill>
-                  <a:srgbClr val="000080"/>
-                </a:solidFill>
-                <a:latin typeface="Consolas" panose="020B0609020204030204" pitchFamily="49" charset="0"/>
-                <a:cs typeface="Consolas" panose="020B0609020204030204" pitchFamily="49" charset="0"/>
-              </a:rPr>
-              <a:t>void</a:t>
-            </a:r>
-            <a:r>
-              <a:rPr lang="de-DE" altLang="de-DE" sz="1600" b="1" dirty="0">
-                <a:solidFill>
-                  <a:srgbClr val="000080"/>
-                </a:solidFill>
-                <a:latin typeface="Consolas" panose="020B0609020204030204" pitchFamily="49" charset="0"/>
-                <a:cs typeface="Consolas" panose="020B0609020204030204" pitchFamily="49" charset="0"/>
-              </a:rPr>
-              <a:t> </a:t>
-            </a:r>
-            <a:r>
-              <a:rPr lang="de-DE" altLang="de-DE" sz="1600" dirty="0" err="1">
-                <a:solidFill>
-                  <a:srgbClr val="000000"/>
-                </a:solidFill>
-                <a:latin typeface="Consolas" panose="020B0609020204030204" pitchFamily="49" charset="0"/>
-                <a:cs typeface="Consolas" panose="020B0609020204030204" pitchFamily="49" charset="0"/>
-              </a:rPr>
-              <a:t>renderHead</a:t>
-            </a:r>
-            <a:r>
-              <a:rPr lang="de-DE" altLang="de-DE" sz="1600" dirty="0">
-                <a:solidFill>
-                  <a:srgbClr val="000000"/>
-                </a:solidFill>
-                <a:latin typeface="Consolas" panose="020B0609020204030204" pitchFamily="49" charset="0"/>
-                <a:cs typeface="Consolas" panose="020B0609020204030204" pitchFamily="49" charset="0"/>
-              </a:rPr>
-              <a:t>(</a:t>
-            </a:r>
-            <a:r>
-              <a:rPr lang="de-DE" altLang="de-DE" sz="1600" dirty="0" err="1">
-                <a:solidFill>
-                  <a:srgbClr val="000000"/>
-                </a:solidFill>
-                <a:latin typeface="Consolas" panose="020B0609020204030204" pitchFamily="49" charset="0"/>
-                <a:cs typeface="Consolas" panose="020B0609020204030204" pitchFamily="49" charset="0"/>
-              </a:rPr>
-              <a:t>IHeaderResponse</a:t>
-            </a:r>
-            <a:r>
-              <a:rPr lang="de-DE" altLang="de-DE" sz="1600" dirty="0">
-                <a:solidFill>
-                  <a:srgbClr val="000000"/>
-                </a:solidFill>
-                <a:latin typeface="Consolas" panose="020B0609020204030204" pitchFamily="49" charset="0"/>
-                <a:cs typeface="Consolas" panose="020B0609020204030204" pitchFamily="49" charset="0"/>
-              </a:rPr>
-              <a:t> </a:t>
-            </a:r>
-            <a:r>
-              <a:rPr lang="de-DE" altLang="de-DE" sz="1600" dirty="0" err="1">
-                <a:solidFill>
-                  <a:srgbClr val="000000"/>
-                </a:solidFill>
-                <a:latin typeface="Consolas" panose="020B0609020204030204" pitchFamily="49" charset="0"/>
-                <a:cs typeface="Consolas" panose="020B0609020204030204" pitchFamily="49" charset="0"/>
-              </a:rPr>
-              <a:t>response</a:t>
-            </a:r>
-            <a:r>
-              <a:rPr lang="de-DE" altLang="de-DE" sz="1600" dirty="0">
-                <a:solidFill>
-                  <a:srgbClr val="000000"/>
-                </a:solidFill>
-                <a:latin typeface="Consolas" panose="020B0609020204030204" pitchFamily="49" charset="0"/>
-                <a:cs typeface="Consolas" panose="020B0609020204030204" pitchFamily="49" charset="0"/>
-              </a:rPr>
-              <a:t>) {</a:t>
-            </a:r>
-            <a:br>
-              <a:rPr lang="de-DE" altLang="de-DE" sz="1600" dirty="0">
-                <a:solidFill>
-                  <a:srgbClr val="000000"/>
-                </a:solidFill>
-                <a:latin typeface="Consolas" panose="020B0609020204030204" pitchFamily="49" charset="0"/>
-                <a:cs typeface="Consolas" panose="020B0609020204030204" pitchFamily="49" charset="0"/>
-              </a:rPr>
-            </a:br>
-            <a:r>
-              <a:rPr lang="de-DE" altLang="de-DE" sz="1600" dirty="0">
-                <a:solidFill>
-                  <a:srgbClr val="000000"/>
-                </a:solidFill>
-                <a:latin typeface="Consolas" panose="020B0609020204030204" pitchFamily="49" charset="0"/>
-                <a:cs typeface="Consolas" panose="020B0609020204030204" pitchFamily="49" charset="0"/>
-              </a:rPr>
-              <a:t>        </a:t>
-            </a:r>
-            <a:r>
-              <a:rPr lang="de-DE" altLang="de-DE" sz="1600" dirty="0" err="1">
-                <a:solidFill>
-                  <a:srgbClr val="000000"/>
-                </a:solidFill>
-                <a:latin typeface="Consolas" panose="020B0609020204030204" pitchFamily="49" charset="0"/>
-                <a:cs typeface="Consolas" panose="020B0609020204030204" pitchFamily="49" charset="0"/>
-              </a:rPr>
-              <a:t>PackageResourceReference</a:t>
-            </a:r>
-            <a:r>
-              <a:rPr lang="de-DE" altLang="de-DE" sz="1600" dirty="0">
-                <a:solidFill>
-                  <a:srgbClr val="000000"/>
-                </a:solidFill>
-                <a:latin typeface="Consolas" panose="020B0609020204030204" pitchFamily="49" charset="0"/>
-                <a:cs typeface="Consolas" panose="020B0609020204030204" pitchFamily="49" charset="0"/>
-              </a:rPr>
-              <a:t> </a:t>
-            </a:r>
-            <a:r>
-              <a:rPr lang="de-DE" altLang="de-DE" sz="1600" dirty="0" err="1">
-                <a:solidFill>
-                  <a:srgbClr val="000000"/>
-                </a:solidFill>
-                <a:latin typeface="Consolas" panose="020B0609020204030204" pitchFamily="49" charset="0"/>
-                <a:cs typeface="Consolas" panose="020B0609020204030204" pitchFamily="49" charset="0"/>
-              </a:rPr>
-              <a:t>cssFile</a:t>
-            </a:r>
-            <a:r>
-              <a:rPr lang="de-DE" altLang="de-DE" sz="1600" dirty="0">
-                <a:solidFill>
-                  <a:srgbClr val="000000"/>
-                </a:solidFill>
-                <a:latin typeface="Consolas" panose="020B0609020204030204" pitchFamily="49" charset="0"/>
-                <a:cs typeface="Consolas" panose="020B0609020204030204" pitchFamily="49" charset="0"/>
-              </a:rPr>
-              <a:t> =</a:t>
-            </a:r>
-            <a:br>
-              <a:rPr lang="de-DE" altLang="de-DE" sz="1600" dirty="0">
-                <a:solidFill>
-                  <a:srgbClr val="000000"/>
-                </a:solidFill>
-                <a:latin typeface="Consolas" panose="020B0609020204030204" pitchFamily="49" charset="0"/>
-                <a:cs typeface="Consolas" panose="020B0609020204030204" pitchFamily="49" charset="0"/>
-              </a:rPr>
-            </a:br>
-            <a:r>
-              <a:rPr lang="de-DE" altLang="de-DE" sz="1600" dirty="0">
-                <a:solidFill>
-                  <a:srgbClr val="000000"/>
-                </a:solidFill>
-                <a:latin typeface="Consolas" panose="020B0609020204030204" pitchFamily="49" charset="0"/>
-                <a:cs typeface="Consolas" panose="020B0609020204030204" pitchFamily="49" charset="0"/>
-              </a:rPr>
-              <a:t>                </a:t>
-            </a:r>
-            <a:r>
-              <a:rPr lang="de-DE" altLang="de-DE" sz="1600" b="1" dirty="0" err="1">
-                <a:solidFill>
-                  <a:srgbClr val="000080"/>
-                </a:solidFill>
-                <a:latin typeface="Consolas" panose="020B0609020204030204" pitchFamily="49" charset="0"/>
-                <a:cs typeface="Consolas" panose="020B0609020204030204" pitchFamily="49" charset="0"/>
-              </a:rPr>
-              <a:t>new</a:t>
-            </a:r>
-            <a:r>
-              <a:rPr lang="de-DE" altLang="de-DE" sz="1600" b="1" dirty="0">
-                <a:solidFill>
-                  <a:srgbClr val="000080"/>
-                </a:solidFill>
-                <a:latin typeface="Consolas" panose="020B0609020204030204" pitchFamily="49" charset="0"/>
-                <a:cs typeface="Consolas" panose="020B0609020204030204" pitchFamily="49" charset="0"/>
-              </a:rPr>
-              <a:t> </a:t>
-            </a:r>
-            <a:r>
-              <a:rPr lang="de-DE" altLang="de-DE" sz="1600" dirty="0" err="1">
-                <a:solidFill>
-                  <a:srgbClr val="000000"/>
-                </a:solidFill>
-                <a:latin typeface="Consolas" panose="020B0609020204030204" pitchFamily="49" charset="0"/>
-                <a:cs typeface="Consolas" panose="020B0609020204030204" pitchFamily="49" charset="0"/>
-              </a:rPr>
-              <a:t>PackageResourceReference</a:t>
-            </a:r>
-            <a:r>
-              <a:rPr lang="de-DE" altLang="de-DE" sz="1600" dirty="0">
-                <a:solidFill>
-                  <a:srgbClr val="000000"/>
-                </a:solidFill>
-                <a:latin typeface="Consolas" panose="020B0609020204030204" pitchFamily="49" charset="0"/>
-                <a:cs typeface="Consolas" panose="020B0609020204030204" pitchFamily="49" charset="0"/>
-              </a:rPr>
-              <a:t>(</a:t>
-            </a:r>
-            <a:r>
-              <a:rPr lang="de-DE" altLang="de-DE" sz="1600" dirty="0" err="1">
-                <a:solidFill>
-                  <a:srgbClr val="000000"/>
-                </a:solidFill>
-                <a:latin typeface="Consolas" panose="020B0609020204030204" pitchFamily="49" charset="0"/>
-                <a:cs typeface="Consolas" panose="020B0609020204030204" pitchFamily="49" charset="0"/>
-              </a:rPr>
-              <a:t>getClass</a:t>
-            </a:r>
-            <a:r>
-              <a:rPr lang="de-DE" altLang="de-DE" sz="1600" dirty="0">
-                <a:solidFill>
-                  <a:srgbClr val="000000"/>
-                </a:solidFill>
-                <a:latin typeface="Consolas" panose="020B0609020204030204" pitchFamily="49" charset="0"/>
-                <a:cs typeface="Consolas" panose="020B0609020204030204" pitchFamily="49" charset="0"/>
-              </a:rPr>
-              <a:t>(), </a:t>
-            </a:r>
-            <a:r>
-              <a:rPr lang="de-DE" altLang="de-DE" sz="1600" b="1" dirty="0">
-                <a:solidFill>
-                  <a:srgbClr val="008000"/>
-                </a:solidFill>
-                <a:latin typeface="Consolas" panose="020B0609020204030204" pitchFamily="49" charset="0"/>
-                <a:cs typeface="Consolas" panose="020B0609020204030204" pitchFamily="49" charset="0"/>
-              </a:rPr>
-              <a:t>"style.css"</a:t>
-            </a:r>
-            <a:r>
-              <a:rPr lang="de-DE" altLang="de-DE" sz="1600" dirty="0">
-                <a:solidFill>
-                  <a:srgbClr val="000000"/>
-                </a:solidFill>
-                <a:latin typeface="Consolas" panose="020B0609020204030204" pitchFamily="49" charset="0"/>
-                <a:cs typeface="Consolas" panose="020B0609020204030204" pitchFamily="49" charset="0"/>
-              </a:rPr>
-              <a:t>);</a:t>
-            </a:r>
-            <a:br>
-              <a:rPr lang="de-DE" altLang="de-DE" sz="1600" dirty="0">
-                <a:solidFill>
-                  <a:srgbClr val="000000"/>
-                </a:solidFill>
-                <a:latin typeface="Consolas" panose="020B0609020204030204" pitchFamily="49" charset="0"/>
-                <a:cs typeface="Consolas" panose="020B0609020204030204" pitchFamily="49" charset="0"/>
-              </a:rPr>
-            </a:br>
-            <a:r>
-              <a:rPr lang="de-DE" altLang="de-DE" sz="1600" dirty="0">
-                <a:solidFill>
-                  <a:srgbClr val="000000"/>
-                </a:solidFill>
-                <a:latin typeface="Consolas" panose="020B0609020204030204" pitchFamily="49" charset="0"/>
-                <a:cs typeface="Consolas" panose="020B0609020204030204" pitchFamily="49" charset="0"/>
-              </a:rPr>
-              <a:t>        </a:t>
-            </a:r>
-            <a:r>
-              <a:rPr lang="de-DE" altLang="de-DE" sz="1600" dirty="0" err="1">
-                <a:solidFill>
-                  <a:srgbClr val="000000"/>
-                </a:solidFill>
-                <a:latin typeface="Consolas" panose="020B0609020204030204" pitchFamily="49" charset="0"/>
-                <a:cs typeface="Consolas" panose="020B0609020204030204" pitchFamily="49" charset="0"/>
-              </a:rPr>
-              <a:t>CssHeaderItem</a:t>
-            </a:r>
-            <a:r>
-              <a:rPr lang="de-DE" altLang="de-DE" sz="1600" dirty="0">
-                <a:solidFill>
-                  <a:srgbClr val="000000"/>
-                </a:solidFill>
-                <a:latin typeface="Consolas" panose="020B0609020204030204" pitchFamily="49" charset="0"/>
-                <a:cs typeface="Consolas" panose="020B0609020204030204" pitchFamily="49" charset="0"/>
-              </a:rPr>
-              <a:t> </a:t>
-            </a:r>
-            <a:r>
-              <a:rPr lang="de-DE" altLang="de-DE" sz="1600" dirty="0" err="1">
-                <a:solidFill>
-                  <a:srgbClr val="000000"/>
-                </a:solidFill>
-                <a:latin typeface="Consolas" panose="020B0609020204030204" pitchFamily="49" charset="0"/>
-                <a:cs typeface="Consolas" panose="020B0609020204030204" pitchFamily="49" charset="0"/>
-              </a:rPr>
-              <a:t>cssItem</a:t>
-            </a:r>
-            <a:r>
-              <a:rPr lang="de-DE" altLang="de-DE" sz="1600" dirty="0">
-                <a:solidFill>
-                  <a:srgbClr val="000000"/>
-                </a:solidFill>
-                <a:latin typeface="Consolas" panose="020B0609020204030204" pitchFamily="49" charset="0"/>
-                <a:cs typeface="Consolas" panose="020B0609020204030204" pitchFamily="49" charset="0"/>
-              </a:rPr>
-              <a:t> = </a:t>
-            </a:r>
-            <a:r>
-              <a:rPr lang="de-DE" altLang="de-DE" sz="1600" dirty="0" err="1">
-                <a:solidFill>
-                  <a:srgbClr val="000000"/>
-                </a:solidFill>
-                <a:latin typeface="Consolas" panose="020B0609020204030204" pitchFamily="49" charset="0"/>
-                <a:cs typeface="Consolas" panose="020B0609020204030204" pitchFamily="49" charset="0"/>
-              </a:rPr>
-              <a:t>CssHeaderItem.forReference</a:t>
-            </a:r>
-            <a:r>
-              <a:rPr lang="de-DE" altLang="de-DE" sz="1600" dirty="0">
-                <a:solidFill>
-                  <a:srgbClr val="000000"/>
-                </a:solidFill>
-                <a:latin typeface="Consolas" panose="020B0609020204030204" pitchFamily="49" charset="0"/>
-                <a:cs typeface="Consolas" panose="020B0609020204030204" pitchFamily="49" charset="0"/>
-              </a:rPr>
-              <a:t>(</a:t>
-            </a:r>
-            <a:r>
-              <a:rPr lang="de-DE" altLang="de-DE" sz="1600" dirty="0" err="1">
-                <a:solidFill>
-                  <a:srgbClr val="000000"/>
-                </a:solidFill>
-                <a:latin typeface="Consolas" panose="020B0609020204030204" pitchFamily="49" charset="0"/>
-                <a:cs typeface="Consolas" panose="020B0609020204030204" pitchFamily="49" charset="0"/>
-              </a:rPr>
-              <a:t>cssFile</a:t>
-            </a:r>
-            <a:r>
-              <a:rPr lang="de-DE" altLang="de-DE" sz="1600" dirty="0">
-                <a:solidFill>
-                  <a:srgbClr val="000000"/>
-                </a:solidFill>
-                <a:latin typeface="Consolas" panose="020B0609020204030204" pitchFamily="49" charset="0"/>
-                <a:cs typeface="Consolas" panose="020B0609020204030204" pitchFamily="49" charset="0"/>
-              </a:rPr>
-              <a:t>);</a:t>
-            </a:r>
-            <a:br>
-              <a:rPr lang="de-DE" altLang="de-DE" sz="1600" dirty="0">
-                <a:solidFill>
-                  <a:srgbClr val="000000"/>
-                </a:solidFill>
-                <a:latin typeface="Consolas" panose="020B0609020204030204" pitchFamily="49" charset="0"/>
-                <a:cs typeface="Consolas" panose="020B0609020204030204" pitchFamily="49" charset="0"/>
-              </a:rPr>
-            </a:br>
-            <a:br>
-              <a:rPr lang="de-DE" altLang="de-DE" sz="1600" dirty="0">
-                <a:solidFill>
-                  <a:srgbClr val="000000"/>
-                </a:solidFill>
-                <a:latin typeface="Consolas" panose="020B0609020204030204" pitchFamily="49" charset="0"/>
-                <a:cs typeface="Consolas" panose="020B0609020204030204" pitchFamily="49" charset="0"/>
-              </a:rPr>
-            </a:br>
-            <a:r>
-              <a:rPr lang="de-DE" altLang="de-DE" sz="1600" dirty="0">
-                <a:solidFill>
-                  <a:srgbClr val="000000"/>
-                </a:solidFill>
-                <a:latin typeface="Consolas" panose="020B0609020204030204" pitchFamily="49" charset="0"/>
-                <a:cs typeface="Consolas" panose="020B0609020204030204" pitchFamily="49" charset="0"/>
-              </a:rPr>
-              <a:t>        </a:t>
-            </a:r>
-            <a:r>
-              <a:rPr lang="de-DE" altLang="de-DE" sz="1600" dirty="0" err="1">
-                <a:solidFill>
-                  <a:srgbClr val="000000"/>
-                </a:solidFill>
-                <a:latin typeface="Consolas" panose="020B0609020204030204" pitchFamily="49" charset="0"/>
-                <a:cs typeface="Consolas" panose="020B0609020204030204" pitchFamily="49" charset="0"/>
-              </a:rPr>
-              <a:t>response.render</a:t>
-            </a:r>
-            <a:r>
-              <a:rPr lang="de-DE" altLang="de-DE" sz="1600" dirty="0">
-                <a:solidFill>
-                  <a:srgbClr val="000000"/>
-                </a:solidFill>
-                <a:latin typeface="Consolas" panose="020B0609020204030204" pitchFamily="49" charset="0"/>
-                <a:cs typeface="Consolas" panose="020B0609020204030204" pitchFamily="49" charset="0"/>
-              </a:rPr>
-              <a:t>(</a:t>
-            </a:r>
-            <a:r>
-              <a:rPr lang="de-DE" altLang="de-DE" sz="1600" dirty="0" err="1">
-                <a:solidFill>
-                  <a:srgbClr val="000000"/>
-                </a:solidFill>
-                <a:latin typeface="Consolas" panose="020B0609020204030204" pitchFamily="49" charset="0"/>
-                <a:cs typeface="Consolas" panose="020B0609020204030204" pitchFamily="49" charset="0"/>
-              </a:rPr>
-              <a:t>cssItem</a:t>
-            </a:r>
-            <a:r>
-              <a:rPr lang="de-DE" altLang="de-DE" sz="1600" dirty="0">
-                <a:solidFill>
-                  <a:srgbClr val="000000"/>
-                </a:solidFill>
-                <a:latin typeface="Consolas" panose="020B0609020204030204" pitchFamily="49" charset="0"/>
-                <a:cs typeface="Consolas" panose="020B0609020204030204" pitchFamily="49" charset="0"/>
-              </a:rPr>
-              <a:t>);</a:t>
-            </a:r>
-            <a:br>
-              <a:rPr lang="de-DE" altLang="de-DE" sz="1600" dirty="0">
-                <a:solidFill>
-                  <a:srgbClr val="000000"/>
-                </a:solidFill>
-                <a:latin typeface="Consolas" panose="020B0609020204030204" pitchFamily="49" charset="0"/>
-                <a:cs typeface="Consolas" panose="020B0609020204030204" pitchFamily="49" charset="0"/>
-              </a:rPr>
-            </a:br>
-            <a:r>
-              <a:rPr lang="de-DE" altLang="de-DE" sz="1600" dirty="0">
-                <a:solidFill>
-                  <a:srgbClr val="000000"/>
-                </a:solidFill>
-                <a:latin typeface="Consolas" panose="020B0609020204030204" pitchFamily="49" charset="0"/>
-                <a:cs typeface="Consolas" panose="020B0609020204030204" pitchFamily="49" charset="0"/>
-              </a:rPr>
-              <a:t>    }</a:t>
-            </a:r>
-            <a:br>
-              <a:rPr lang="de-DE" altLang="de-DE" sz="1600" dirty="0">
-                <a:solidFill>
-                  <a:srgbClr val="000000"/>
-                </a:solidFill>
-                <a:latin typeface="Consolas" panose="020B0609020204030204" pitchFamily="49" charset="0"/>
-                <a:cs typeface="Consolas" panose="020B0609020204030204" pitchFamily="49" charset="0"/>
-              </a:rPr>
-            </a:br>
-            <a:r>
-              <a:rPr lang="de-DE" altLang="de-DE" sz="1600" dirty="0">
-                <a:solidFill>
-                  <a:srgbClr val="000000"/>
-                </a:solidFill>
-                <a:latin typeface="Consolas" panose="020B0609020204030204" pitchFamily="49" charset="0"/>
-                <a:cs typeface="Consolas" panose="020B0609020204030204" pitchFamily="49" charset="0"/>
-              </a:rPr>
-              <a:t>}</a:t>
-            </a:r>
-            <a:endParaRPr lang="de-DE" sz="1600" dirty="0">
+            <a:endParaRPr lang="de-DE" altLang="de-DE" sz="1600" dirty="0" smtClean="0">
+              <a:solidFill>
+                <a:srgbClr val="000000"/>
+              </a:solidFill>
               <a:latin typeface="Consolas" panose="020B0609020204030204" pitchFamily="49" charset="0"/>
               <a:cs typeface="Consolas" panose="020B0609020204030204" pitchFamily="49" charset="0"/>
             </a:endParaRPr>
           </a:p>
           <a:p>
+            <a:pPr marL="0" lvl="0" indent="0">
+              <a:spcBef>
+                <a:spcPct val="0"/>
+              </a:spcBef>
+              <a:buClrTx/>
+              <a:buNone/>
+            </a:pPr>
+            <a:r>
+              <a:rPr lang="de-DE" altLang="de-DE" sz="1600" dirty="0" smtClean="0">
+                <a:solidFill>
+                  <a:srgbClr val="FFC000"/>
+                </a:solidFill>
+                <a:latin typeface="Consolas" panose="020B0609020204030204" pitchFamily="49" charset="0"/>
+                <a:cs typeface="Consolas" panose="020B0609020204030204" pitchFamily="49" charset="0"/>
+              </a:rPr>
+              <a:t>    </a:t>
+            </a:r>
+            <a:r>
+              <a:rPr lang="de-DE" altLang="de-DE" sz="1600" dirty="0">
+                <a:solidFill>
+                  <a:srgbClr val="FFC000"/>
+                </a:solidFill>
+                <a:latin typeface="Consolas" panose="020B0609020204030204" pitchFamily="49" charset="0"/>
+                <a:cs typeface="Consolas" panose="020B0609020204030204" pitchFamily="49" charset="0"/>
+              </a:rPr>
+              <a:t>@</a:t>
+            </a:r>
+            <a:r>
+              <a:rPr lang="de-DE" altLang="de-DE" sz="1600" dirty="0" err="1">
+                <a:solidFill>
+                  <a:srgbClr val="FFC000"/>
+                </a:solidFill>
+                <a:latin typeface="Consolas" panose="020B0609020204030204" pitchFamily="49" charset="0"/>
+                <a:cs typeface="Consolas" panose="020B0609020204030204" pitchFamily="49" charset="0"/>
+              </a:rPr>
+              <a:t>Override</a:t>
+            </a:r>
+            <a:endParaRPr lang="de-DE" altLang="de-DE" sz="1600" dirty="0">
+              <a:solidFill>
+                <a:srgbClr val="FFC000"/>
+              </a:solidFill>
+              <a:latin typeface="Consolas" panose="020B0609020204030204" pitchFamily="49" charset="0"/>
+              <a:cs typeface="Consolas" panose="020B0609020204030204" pitchFamily="49" charset="0"/>
+            </a:endParaRPr>
+          </a:p>
+          <a:p>
+            <a:pPr marL="0" lvl="0" indent="0">
+              <a:spcBef>
+                <a:spcPct val="0"/>
+              </a:spcBef>
+              <a:buClrTx/>
+              <a:buNone/>
+            </a:pPr>
+            <a:r>
+              <a:rPr lang="de-DE" altLang="de-DE" sz="1600" dirty="0">
+                <a:solidFill>
+                  <a:srgbClr val="000000"/>
+                </a:solidFill>
+                <a:latin typeface="Consolas" panose="020B0609020204030204" pitchFamily="49" charset="0"/>
+                <a:cs typeface="Consolas" panose="020B0609020204030204" pitchFamily="49" charset="0"/>
+              </a:rPr>
+              <a:t>    </a:t>
+            </a:r>
+            <a:r>
+              <a:rPr lang="de-DE" altLang="de-DE" sz="1600" b="1" dirty="0" err="1">
+                <a:solidFill>
+                  <a:srgbClr val="000080"/>
+                </a:solidFill>
+                <a:latin typeface="Consolas" panose="020B0609020204030204" pitchFamily="49" charset="0"/>
+                <a:cs typeface="Consolas" panose="020B0609020204030204" pitchFamily="49" charset="0"/>
+              </a:rPr>
+              <a:t>public</a:t>
+            </a:r>
+            <a:r>
+              <a:rPr lang="de-DE" altLang="de-DE" sz="1600" dirty="0">
+                <a:solidFill>
+                  <a:srgbClr val="000000"/>
+                </a:solidFill>
+                <a:latin typeface="Consolas" panose="020B0609020204030204" pitchFamily="49" charset="0"/>
+                <a:cs typeface="Consolas" panose="020B0609020204030204" pitchFamily="49" charset="0"/>
+              </a:rPr>
+              <a:t> </a:t>
+            </a:r>
+            <a:r>
+              <a:rPr lang="de-DE" altLang="de-DE" sz="1600" b="1" dirty="0" err="1">
+                <a:solidFill>
+                  <a:srgbClr val="000080"/>
+                </a:solidFill>
+                <a:latin typeface="Consolas" panose="020B0609020204030204" pitchFamily="49" charset="0"/>
+                <a:cs typeface="Consolas" panose="020B0609020204030204" pitchFamily="49" charset="0"/>
+              </a:rPr>
+              <a:t>void</a:t>
+            </a:r>
+            <a:r>
+              <a:rPr lang="de-DE" altLang="de-DE" sz="1600" dirty="0">
+                <a:solidFill>
+                  <a:srgbClr val="000000"/>
+                </a:solidFill>
+                <a:latin typeface="Consolas" panose="020B0609020204030204" pitchFamily="49" charset="0"/>
+                <a:cs typeface="Consolas" panose="020B0609020204030204" pitchFamily="49" charset="0"/>
+              </a:rPr>
+              <a:t> </a:t>
+            </a:r>
+            <a:r>
+              <a:rPr lang="de-DE" altLang="de-DE" sz="1600" b="1" dirty="0" err="1">
+                <a:solidFill>
+                  <a:srgbClr val="000080"/>
+                </a:solidFill>
+                <a:latin typeface="Consolas" panose="020B0609020204030204" pitchFamily="49" charset="0"/>
+                <a:cs typeface="Consolas" panose="020B0609020204030204" pitchFamily="49" charset="0"/>
+              </a:rPr>
+              <a:t>renderHead</a:t>
+            </a:r>
+            <a:r>
+              <a:rPr lang="de-DE" altLang="de-DE" sz="1600" dirty="0">
+                <a:solidFill>
+                  <a:srgbClr val="000000"/>
+                </a:solidFill>
+                <a:latin typeface="Consolas" panose="020B0609020204030204" pitchFamily="49" charset="0"/>
+                <a:cs typeface="Consolas" panose="020B0609020204030204" pitchFamily="49" charset="0"/>
+              </a:rPr>
+              <a:t>(</a:t>
+            </a:r>
+            <a:r>
+              <a:rPr lang="de-DE" altLang="de-DE" sz="1600" dirty="0" err="1">
+                <a:solidFill>
+                  <a:srgbClr val="000000"/>
+                </a:solidFill>
+                <a:latin typeface="Consolas" panose="020B0609020204030204" pitchFamily="49" charset="0"/>
+                <a:cs typeface="Consolas" panose="020B0609020204030204" pitchFamily="49" charset="0"/>
+              </a:rPr>
+              <a:t>IHeaderResponse</a:t>
+            </a:r>
+            <a:r>
+              <a:rPr lang="de-DE" altLang="de-DE" sz="1600" dirty="0">
+                <a:solidFill>
+                  <a:srgbClr val="000000"/>
+                </a:solidFill>
+                <a:latin typeface="Consolas" panose="020B0609020204030204" pitchFamily="49" charset="0"/>
+                <a:cs typeface="Consolas" panose="020B0609020204030204" pitchFamily="49" charset="0"/>
+              </a:rPr>
+              <a:t> </a:t>
+            </a:r>
+            <a:r>
+              <a:rPr lang="de-DE" altLang="de-DE" sz="1600" dirty="0" err="1">
+                <a:solidFill>
+                  <a:srgbClr val="000000"/>
+                </a:solidFill>
+                <a:latin typeface="Consolas" panose="020B0609020204030204" pitchFamily="49" charset="0"/>
+                <a:cs typeface="Consolas" panose="020B0609020204030204" pitchFamily="49" charset="0"/>
+              </a:rPr>
+              <a:t>response</a:t>
+            </a:r>
+            <a:r>
+              <a:rPr lang="de-DE" altLang="de-DE" sz="1600" dirty="0">
+                <a:solidFill>
+                  <a:srgbClr val="000000"/>
+                </a:solidFill>
+                <a:latin typeface="Consolas" panose="020B0609020204030204" pitchFamily="49" charset="0"/>
+                <a:cs typeface="Consolas" panose="020B0609020204030204" pitchFamily="49" charset="0"/>
+              </a:rPr>
+              <a:t>) {</a:t>
+            </a:r>
+          </a:p>
+          <a:p>
+            <a:pPr marL="0" lvl="0" indent="0">
+              <a:spcBef>
+                <a:spcPct val="0"/>
+              </a:spcBef>
+              <a:buClrTx/>
+              <a:buNone/>
+            </a:pPr>
+            <a:r>
+              <a:rPr lang="de-DE" altLang="de-DE" sz="1600" dirty="0">
+                <a:solidFill>
+                  <a:srgbClr val="000000"/>
+                </a:solidFill>
+                <a:latin typeface="Consolas" panose="020B0609020204030204" pitchFamily="49" charset="0"/>
+                <a:cs typeface="Consolas" panose="020B0609020204030204" pitchFamily="49" charset="0"/>
+              </a:rPr>
+              <a:t>        </a:t>
+            </a:r>
+            <a:r>
+              <a:rPr lang="de-DE" altLang="de-DE" sz="1600" b="1" dirty="0" err="1">
+                <a:solidFill>
+                  <a:srgbClr val="000080"/>
+                </a:solidFill>
+                <a:latin typeface="Consolas" panose="020B0609020204030204" pitchFamily="49" charset="0"/>
+                <a:cs typeface="Consolas" panose="020B0609020204030204" pitchFamily="49" charset="0"/>
+              </a:rPr>
+              <a:t>super</a:t>
+            </a:r>
+            <a:r>
+              <a:rPr lang="de-DE" altLang="de-DE" sz="1600" dirty="0" err="1">
+                <a:solidFill>
+                  <a:srgbClr val="000000"/>
+                </a:solidFill>
+                <a:latin typeface="Consolas" panose="020B0609020204030204" pitchFamily="49" charset="0"/>
+                <a:cs typeface="Consolas" panose="020B0609020204030204" pitchFamily="49" charset="0"/>
+              </a:rPr>
+              <a:t>.renderHead</a:t>
+            </a:r>
+            <a:r>
+              <a:rPr lang="de-DE" altLang="de-DE" sz="1600" dirty="0">
+                <a:solidFill>
+                  <a:srgbClr val="000000"/>
+                </a:solidFill>
+                <a:latin typeface="Consolas" panose="020B0609020204030204" pitchFamily="49" charset="0"/>
+                <a:cs typeface="Consolas" panose="020B0609020204030204" pitchFamily="49" charset="0"/>
+              </a:rPr>
+              <a:t>(</a:t>
+            </a:r>
+            <a:r>
+              <a:rPr lang="de-DE" altLang="de-DE" sz="1600" dirty="0" err="1">
+                <a:solidFill>
+                  <a:srgbClr val="000000"/>
+                </a:solidFill>
+                <a:latin typeface="Consolas" panose="020B0609020204030204" pitchFamily="49" charset="0"/>
+                <a:cs typeface="Consolas" panose="020B0609020204030204" pitchFamily="49" charset="0"/>
+              </a:rPr>
+              <a:t>response</a:t>
+            </a:r>
+            <a:r>
+              <a:rPr lang="de-DE" altLang="de-DE" sz="1600" dirty="0">
+                <a:solidFill>
+                  <a:srgbClr val="000000"/>
+                </a:solidFill>
+                <a:latin typeface="Consolas" panose="020B0609020204030204" pitchFamily="49" charset="0"/>
+                <a:cs typeface="Consolas" panose="020B0609020204030204" pitchFamily="49" charset="0"/>
+              </a:rPr>
+              <a:t>);</a:t>
+            </a:r>
+          </a:p>
+          <a:p>
+            <a:pPr marL="0" lvl="0" indent="0">
+              <a:spcBef>
+                <a:spcPct val="0"/>
+              </a:spcBef>
+              <a:buClrTx/>
+              <a:buNone/>
+            </a:pPr>
+            <a:r>
+              <a:rPr lang="de-DE" altLang="de-DE" sz="1600" dirty="0">
+                <a:solidFill>
+                  <a:srgbClr val="000000"/>
+                </a:solidFill>
+                <a:latin typeface="Consolas" panose="020B0609020204030204" pitchFamily="49" charset="0"/>
+                <a:cs typeface="Consolas" panose="020B0609020204030204" pitchFamily="49" charset="0"/>
+              </a:rPr>
+              <a:t>        </a:t>
+            </a:r>
+          </a:p>
+          <a:p>
+            <a:pPr marL="0" lvl="0" indent="0">
+              <a:spcBef>
+                <a:spcPct val="0"/>
+              </a:spcBef>
+              <a:buClrTx/>
+              <a:buNone/>
+            </a:pPr>
+            <a:r>
+              <a:rPr lang="de-DE" altLang="de-DE" sz="1600" dirty="0">
+                <a:solidFill>
+                  <a:srgbClr val="000000"/>
+                </a:solidFill>
+                <a:latin typeface="Consolas" panose="020B0609020204030204" pitchFamily="49" charset="0"/>
+                <a:cs typeface="Consolas" panose="020B0609020204030204" pitchFamily="49" charset="0"/>
+              </a:rPr>
+              <a:t>	</a:t>
+            </a:r>
+            <a:r>
+              <a:rPr lang="de-DE" altLang="de-DE" sz="1600" dirty="0" err="1">
+                <a:solidFill>
+                  <a:srgbClr val="000000"/>
+                </a:solidFill>
+                <a:latin typeface="Consolas" panose="020B0609020204030204" pitchFamily="49" charset="0"/>
+                <a:cs typeface="Consolas" panose="020B0609020204030204" pitchFamily="49" charset="0"/>
+              </a:rPr>
+              <a:t>response.render</a:t>
+            </a:r>
+            <a:r>
+              <a:rPr lang="de-DE" altLang="de-DE" sz="1600" dirty="0">
+                <a:solidFill>
+                  <a:srgbClr val="000000"/>
+                </a:solidFill>
+                <a:latin typeface="Consolas" panose="020B0609020204030204" pitchFamily="49" charset="0"/>
+                <a:cs typeface="Consolas" panose="020B0609020204030204" pitchFamily="49" charset="0"/>
+              </a:rPr>
+              <a:t>(</a:t>
+            </a:r>
+            <a:r>
+              <a:rPr lang="de-DE" altLang="de-DE" sz="1600" dirty="0" err="1">
+                <a:solidFill>
+                  <a:srgbClr val="000000"/>
+                </a:solidFill>
+                <a:latin typeface="Consolas" panose="020B0609020204030204" pitchFamily="49" charset="0"/>
+                <a:cs typeface="Consolas" panose="020B0609020204030204" pitchFamily="49" charset="0"/>
+              </a:rPr>
+              <a:t>CssHeaderItem.forReference</a:t>
+            </a:r>
+            <a:r>
+              <a:rPr lang="de-DE" altLang="de-DE" sz="1600" dirty="0">
+                <a:solidFill>
+                  <a:srgbClr val="000000"/>
+                </a:solidFill>
+                <a:latin typeface="Consolas" panose="020B0609020204030204" pitchFamily="49" charset="0"/>
+                <a:cs typeface="Consolas" panose="020B0609020204030204" pitchFamily="49" charset="0"/>
+              </a:rPr>
+              <a:t>(</a:t>
+            </a:r>
+          </a:p>
+          <a:p>
+            <a:pPr marL="0" lvl="0" indent="0">
+              <a:spcBef>
+                <a:spcPct val="0"/>
+              </a:spcBef>
+              <a:buClrTx/>
+              <a:buNone/>
+            </a:pPr>
+            <a:r>
+              <a:rPr lang="de-DE" altLang="de-DE" sz="1600" dirty="0">
+                <a:solidFill>
+                  <a:srgbClr val="000000"/>
+                </a:solidFill>
+                <a:latin typeface="Consolas" panose="020B0609020204030204" pitchFamily="49" charset="0"/>
+                <a:cs typeface="Consolas" panose="020B0609020204030204" pitchFamily="49" charset="0"/>
+              </a:rPr>
+              <a:t>	</a:t>
+            </a:r>
+            <a:r>
+              <a:rPr lang="de-DE" altLang="de-DE" sz="1600" b="1" dirty="0" err="1">
+                <a:solidFill>
+                  <a:srgbClr val="000080"/>
+                </a:solidFill>
+                <a:latin typeface="Consolas" panose="020B0609020204030204" pitchFamily="49" charset="0"/>
+                <a:cs typeface="Consolas" panose="020B0609020204030204" pitchFamily="49" charset="0"/>
+              </a:rPr>
+              <a:t>new</a:t>
+            </a:r>
+            <a:r>
+              <a:rPr lang="de-DE" altLang="de-DE" sz="1600" dirty="0">
+                <a:solidFill>
+                  <a:srgbClr val="000000"/>
+                </a:solidFill>
+                <a:latin typeface="Consolas" panose="020B0609020204030204" pitchFamily="49" charset="0"/>
+                <a:cs typeface="Consolas" panose="020B0609020204030204" pitchFamily="49" charset="0"/>
+              </a:rPr>
+              <a:t> </a:t>
+            </a:r>
+            <a:r>
+              <a:rPr lang="de-DE" altLang="de-DE" sz="1600" dirty="0" err="1">
+                <a:solidFill>
+                  <a:srgbClr val="000000"/>
+                </a:solidFill>
+                <a:latin typeface="Consolas" panose="020B0609020204030204" pitchFamily="49" charset="0"/>
+                <a:cs typeface="Consolas" panose="020B0609020204030204" pitchFamily="49" charset="0"/>
+              </a:rPr>
+              <a:t>CssResourceReference</a:t>
+            </a:r>
+            <a:r>
+              <a:rPr lang="de-DE" altLang="de-DE" sz="1600" dirty="0">
+                <a:solidFill>
+                  <a:srgbClr val="000000"/>
+                </a:solidFill>
+                <a:latin typeface="Consolas" panose="020B0609020204030204" pitchFamily="49" charset="0"/>
+                <a:cs typeface="Consolas" panose="020B0609020204030204" pitchFamily="49" charset="0"/>
+              </a:rPr>
+              <a:t>(</a:t>
+            </a:r>
+            <a:r>
+              <a:rPr lang="de-DE" altLang="de-DE" sz="1600" dirty="0" err="1">
+                <a:solidFill>
+                  <a:srgbClr val="000000"/>
+                </a:solidFill>
+                <a:latin typeface="Consolas" panose="020B0609020204030204" pitchFamily="49" charset="0"/>
+                <a:cs typeface="Consolas" panose="020B0609020204030204" pitchFamily="49" charset="0"/>
+              </a:rPr>
+              <a:t>Index.</a:t>
+            </a:r>
+            <a:r>
+              <a:rPr lang="de-DE" altLang="de-DE" sz="1600" b="1" dirty="0" err="1">
+                <a:solidFill>
+                  <a:srgbClr val="000080"/>
+                </a:solidFill>
+                <a:latin typeface="Consolas" panose="020B0609020204030204" pitchFamily="49" charset="0"/>
+                <a:cs typeface="Consolas" panose="020B0609020204030204" pitchFamily="49" charset="0"/>
+              </a:rPr>
+              <a:t>class</a:t>
+            </a:r>
+            <a:r>
+              <a:rPr lang="de-DE" altLang="de-DE" sz="1600" dirty="0">
+                <a:solidFill>
+                  <a:srgbClr val="000000"/>
+                </a:solidFill>
+                <a:latin typeface="Consolas" panose="020B0609020204030204" pitchFamily="49" charset="0"/>
+                <a:cs typeface="Consolas" panose="020B0609020204030204" pitchFamily="49" charset="0"/>
+              </a:rPr>
+              <a:t>, "</a:t>
+            </a:r>
+            <a:r>
+              <a:rPr lang="de-DE" altLang="de-DE" sz="1600" dirty="0">
+                <a:solidFill>
+                  <a:schemeClr val="accent2"/>
+                </a:solidFill>
+                <a:latin typeface="Consolas" panose="020B0609020204030204" pitchFamily="49" charset="0"/>
+                <a:cs typeface="Consolas" panose="020B0609020204030204" pitchFamily="49" charset="0"/>
+              </a:rPr>
+              <a:t>PATH_TO_CSS_FILE</a:t>
+            </a:r>
+            <a:r>
+              <a:rPr lang="de-DE" altLang="de-DE" sz="1600" dirty="0">
+                <a:solidFill>
+                  <a:srgbClr val="000000"/>
+                </a:solidFill>
+                <a:latin typeface="Consolas" panose="020B0609020204030204" pitchFamily="49" charset="0"/>
+                <a:cs typeface="Consolas" panose="020B0609020204030204" pitchFamily="49" charset="0"/>
+              </a:rPr>
+              <a:t>")));</a:t>
+            </a:r>
+          </a:p>
+          <a:p>
+            <a:pPr marL="0" lvl="0" indent="0">
+              <a:spcBef>
+                <a:spcPct val="0"/>
+              </a:spcBef>
+              <a:buClrTx/>
+              <a:buNone/>
+            </a:pPr>
+            <a:r>
+              <a:rPr lang="de-DE" altLang="de-DE" sz="1600" dirty="0">
+                <a:solidFill>
+                  <a:srgbClr val="000000"/>
+                </a:solidFill>
+                <a:latin typeface="Consolas" panose="020B0609020204030204" pitchFamily="49" charset="0"/>
+                <a:cs typeface="Consolas" panose="020B0609020204030204" pitchFamily="49" charset="0"/>
+              </a:rPr>
+              <a:t>        </a:t>
+            </a:r>
+          </a:p>
+          <a:p>
+            <a:pPr marL="0" lvl="0" indent="0">
+              <a:spcBef>
+                <a:spcPct val="0"/>
+              </a:spcBef>
+              <a:buClrTx/>
+              <a:buNone/>
+            </a:pPr>
+            <a:r>
+              <a:rPr lang="de-DE" altLang="de-DE" sz="1600" dirty="0">
+                <a:solidFill>
+                  <a:srgbClr val="000000"/>
+                </a:solidFill>
+                <a:latin typeface="Consolas" panose="020B0609020204030204" pitchFamily="49" charset="0"/>
+                <a:cs typeface="Consolas" panose="020B0609020204030204" pitchFamily="49" charset="0"/>
+              </a:rPr>
+              <a:t>	</a:t>
+            </a:r>
+            <a:r>
+              <a:rPr lang="de-DE" altLang="de-DE" sz="1600" dirty="0" err="1">
+                <a:solidFill>
+                  <a:srgbClr val="000000"/>
+                </a:solidFill>
+                <a:latin typeface="Consolas" panose="020B0609020204030204" pitchFamily="49" charset="0"/>
+                <a:cs typeface="Consolas" panose="020B0609020204030204" pitchFamily="49" charset="0"/>
+              </a:rPr>
+              <a:t>response.render</a:t>
+            </a:r>
+            <a:r>
+              <a:rPr lang="de-DE" altLang="de-DE" sz="1600" dirty="0">
+                <a:solidFill>
+                  <a:srgbClr val="000000"/>
+                </a:solidFill>
+                <a:latin typeface="Consolas" panose="020B0609020204030204" pitchFamily="49" charset="0"/>
+                <a:cs typeface="Consolas" panose="020B0609020204030204" pitchFamily="49" charset="0"/>
+              </a:rPr>
+              <a:t>(</a:t>
+            </a:r>
+            <a:r>
+              <a:rPr lang="de-DE" altLang="de-DE" sz="1600" dirty="0" err="1">
+                <a:solidFill>
+                  <a:srgbClr val="000000"/>
+                </a:solidFill>
+                <a:latin typeface="Consolas" panose="020B0609020204030204" pitchFamily="49" charset="0"/>
+                <a:cs typeface="Consolas" panose="020B0609020204030204" pitchFamily="49" charset="0"/>
+              </a:rPr>
+              <a:t>JavaScriptHeaderItem.forReference</a:t>
+            </a:r>
+            <a:r>
+              <a:rPr lang="de-DE" altLang="de-DE" sz="1600" dirty="0">
+                <a:solidFill>
+                  <a:srgbClr val="000000"/>
+                </a:solidFill>
+                <a:latin typeface="Consolas" panose="020B0609020204030204" pitchFamily="49" charset="0"/>
+                <a:cs typeface="Consolas" panose="020B0609020204030204" pitchFamily="49" charset="0"/>
+              </a:rPr>
+              <a:t>(</a:t>
+            </a:r>
+          </a:p>
+          <a:p>
+            <a:pPr marL="0" lvl="0" indent="0">
+              <a:spcBef>
+                <a:spcPct val="0"/>
+              </a:spcBef>
+              <a:buClrTx/>
+              <a:buNone/>
+            </a:pPr>
+            <a:r>
+              <a:rPr lang="de-DE" altLang="de-DE" sz="1600" dirty="0">
+                <a:solidFill>
+                  <a:srgbClr val="000000"/>
+                </a:solidFill>
+                <a:latin typeface="Consolas" panose="020B0609020204030204" pitchFamily="49" charset="0"/>
+                <a:cs typeface="Consolas" panose="020B0609020204030204" pitchFamily="49" charset="0"/>
+              </a:rPr>
+              <a:t>	</a:t>
+            </a:r>
+            <a:r>
+              <a:rPr lang="de-DE" altLang="de-DE" sz="1600" b="1" dirty="0" err="1">
+                <a:solidFill>
+                  <a:srgbClr val="000080"/>
+                </a:solidFill>
+                <a:latin typeface="Consolas" panose="020B0609020204030204" pitchFamily="49" charset="0"/>
+                <a:cs typeface="Consolas" panose="020B0609020204030204" pitchFamily="49" charset="0"/>
+              </a:rPr>
+              <a:t>new</a:t>
+            </a:r>
+            <a:r>
+              <a:rPr lang="de-DE" altLang="de-DE" sz="1600" dirty="0">
+                <a:solidFill>
+                  <a:srgbClr val="000000"/>
+                </a:solidFill>
+                <a:latin typeface="Consolas" panose="020B0609020204030204" pitchFamily="49" charset="0"/>
+                <a:cs typeface="Consolas" panose="020B0609020204030204" pitchFamily="49" charset="0"/>
+              </a:rPr>
+              <a:t> </a:t>
+            </a:r>
+            <a:r>
+              <a:rPr lang="de-DE" altLang="de-DE" sz="1600" dirty="0" err="1">
+                <a:solidFill>
+                  <a:srgbClr val="000000"/>
+                </a:solidFill>
+                <a:latin typeface="Consolas" panose="020B0609020204030204" pitchFamily="49" charset="0"/>
+                <a:cs typeface="Consolas" panose="020B0609020204030204" pitchFamily="49" charset="0"/>
+              </a:rPr>
+              <a:t>JavaScriptResourceReference</a:t>
+            </a:r>
+            <a:r>
+              <a:rPr lang="de-DE" altLang="de-DE" sz="1600" dirty="0">
+                <a:solidFill>
+                  <a:srgbClr val="000000"/>
+                </a:solidFill>
+                <a:latin typeface="Consolas" panose="020B0609020204030204" pitchFamily="49" charset="0"/>
+                <a:cs typeface="Consolas" panose="020B0609020204030204" pitchFamily="49" charset="0"/>
+              </a:rPr>
+              <a:t>(</a:t>
+            </a:r>
+            <a:r>
+              <a:rPr lang="de-DE" altLang="de-DE" sz="1600" dirty="0" err="1">
+                <a:solidFill>
+                  <a:srgbClr val="000000"/>
+                </a:solidFill>
+                <a:latin typeface="Consolas" panose="020B0609020204030204" pitchFamily="49" charset="0"/>
+                <a:cs typeface="Consolas" panose="020B0609020204030204" pitchFamily="49" charset="0"/>
+              </a:rPr>
+              <a:t>Index.</a:t>
+            </a:r>
+            <a:r>
+              <a:rPr lang="de-DE" altLang="de-DE" sz="1600" b="1" dirty="0" err="1">
+                <a:solidFill>
+                  <a:srgbClr val="000080"/>
+                </a:solidFill>
+                <a:latin typeface="Consolas" panose="020B0609020204030204" pitchFamily="49" charset="0"/>
+                <a:cs typeface="Consolas" panose="020B0609020204030204" pitchFamily="49" charset="0"/>
+              </a:rPr>
+              <a:t>class</a:t>
+            </a:r>
+            <a:r>
+              <a:rPr lang="de-DE" altLang="de-DE" sz="1600" dirty="0">
+                <a:solidFill>
+                  <a:srgbClr val="000000"/>
+                </a:solidFill>
+                <a:latin typeface="Consolas" panose="020B0609020204030204" pitchFamily="49" charset="0"/>
+                <a:cs typeface="Consolas" panose="020B0609020204030204" pitchFamily="49" charset="0"/>
+              </a:rPr>
+              <a:t>, "</a:t>
+            </a:r>
+            <a:r>
+              <a:rPr lang="de-DE" altLang="de-DE" sz="1600" dirty="0">
+                <a:solidFill>
+                  <a:schemeClr val="accent2"/>
+                </a:solidFill>
+                <a:latin typeface="Consolas" panose="020B0609020204030204" pitchFamily="49" charset="0"/>
+                <a:cs typeface="Consolas" panose="020B0609020204030204" pitchFamily="49" charset="0"/>
+              </a:rPr>
+              <a:t>PATH_TO_JSS_FILE</a:t>
+            </a:r>
+            <a:r>
+              <a:rPr lang="de-DE" altLang="de-DE" sz="1600" dirty="0">
+                <a:solidFill>
+                  <a:srgbClr val="000000"/>
+                </a:solidFill>
+                <a:latin typeface="Consolas" panose="020B0609020204030204" pitchFamily="49" charset="0"/>
+                <a:cs typeface="Consolas" panose="020B0609020204030204" pitchFamily="49" charset="0"/>
+              </a:rPr>
+              <a:t>")));</a:t>
+            </a:r>
+          </a:p>
+          <a:p>
+            <a:pPr marL="0" lvl="0" indent="0">
+              <a:spcBef>
+                <a:spcPct val="0"/>
+              </a:spcBef>
+              <a:buClrTx/>
+              <a:buNone/>
+            </a:pPr>
+            <a:r>
+              <a:rPr lang="de-DE" altLang="de-DE" sz="1600" dirty="0">
+                <a:solidFill>
+                  <a:srgbClr val="000000"/>
+                </a:solidFill>
+                <a:latin typeface="Consolas" panose="020B0609020204030204" pitchFamily="49" charset="0"/>
+                <a:cs typeface="Consolas" panose="020B0609020204030204" pitchFamily="49" charset="0"/>
+              </a:rPr>
+              <a:t>    </a:t>
+            </a:r>
+            <a:r>
+              <a:rPr lang="de-DE" altLang="de-DE" sz="1600" dirty="0" smtClean="0">
+                <a:solidFill>
+                  <a:srgbClr val="000000"/>
+                </a:solidFill>
+                <a:latin typeface="Consolas" panose="020B0609020204030204" pitchFamily="49" charset="0"/>
+                <a:cs typeface="Consolas" panose="020B0609020204030204" pitchFamily="49" charset="0"/>
+              </a:rPr>
+              <a:t>    }</a:t>
+            </a:r>
+          </a:p>
+          <a:p>
+            <a:pPr marL="0" lvl="0" indent="0">
+              <a:spcBef>
+                <a:spcPct val="0"/>
+              </a:spcBef>
+              <a:buClrTx/>
+              <a:buNone/>
+            </a:pPr>
+            <a:r>
+              <a:rPr lang="de-DE" sz="1600" dirty="0">
+                <a:solidFill>
+                  <a:srgbClr val="000000"/>
+                </a:solidFill>
+                <a:latin typeface="Consolas" panose="020B0609020204030204" pitchFamily="49" charset="0"/>
+                <a:cs typeface="Consolas" panose="020B0609020204030204" pitchFamily="49" charset="0"/>
+              </a:rPr>
+              <a:t> </a:t>
+            </a:r>
+            <a:r>
+              <a:rPr lang="de-DE" sz="1600" dirty="0" smtClean="0">
+                <a:solidFill>
+                  <a:srgbClr val="000000"/>
+                </a:solidFill>
+                <a:latin typeface="Consolas" panose="020B0609020204030204" pitchFamily="49" charset="0"/>
+                <a:cs typeface="Consolas" panose="020B0609020204030204" pitchFamily="49" charset="0"/>
+              </a:rPr>
+              <a:t>   </a:t>
+            </a:r>
+            <a:r>
+              <a:rPr lang="de-DE" sz="1600" dirty="0" smtClean="0">
+                <a:solidFill>
+                  <a:srgbClr val="000000"/>
+                </a:solidFill>
+                <a:latin typeface="Consolas" panose="020B0609020204030204" pitchFamily="49" charset="0"/>
+                <a:cs typeface="Consolas" panose="020B0609020204030204" pitchFamily="49" charset="0"/>
+              </a:rPr>
+              <a:t>}</a:t>
+            </a:r>
             <a:endParaRPr lang="de-DE" sz="2000" dirty="0"/>
           </a:p>
         </p:txBody>
@@ -13833,6 +14179,16 @@
               </a:rPr>
               <a:t>Override</a:t>
             </a:r>
+            <a:r>
+              <a:rPr lang="de-DE" altLang="de-DE" sz="1600" dirty="0">
+                <a:solidFill>
+                  <a:srgbClr val="000000"/>
+                </a:solidFill>
+                <a:latin typeface="Consolas" panose="020B0609020204030204" pitchFamily="49" charset="0"/>
+                <a:cs typeface="Consolas" panose="020B0609020204030204" pitchFamily="49" charset="0"/>
+              </a:rPr>
+              <a:t/>
+            </a:r>
             <a:br>
               <a:rPr lang="de-DE" altLang="de-DE" sz="1600" dirty="0">
                 <a:solidFill>
@@ -13960,6 +14316,16 @@
                 <a:cs typeface="Consolas" panose="020B0609020204030204" pitchFamily="49" charset="0"/>
               </a:rPr>
             </a:br>
+            <a:r>
+              <a:rPr lang="de-DE" altLang="de-DE" sz="1600" dirty="0">
+                <a:solidFill>
+                  <a:srgbClr val="000000"/>
+                </a:solidFill>
+                <a:latin typeface="Consolas" panose="020B0609020204030204" pitchFamily="49" charset="0"/>
+                <a:cs typeface="Consolas" panose="020B0609020204030204" pitchFamily="49" charset="0"/>
+              </a:rPr>
+              <a:t/>
+            </a:r>
             <a:br>
               <a:rPr lang="de-DE" altLang="de-DE" sz="1600" dirty="0">
                 <a:solidFill>
@@ -14195,6 +14561,16 @@
                 <a:cs typeface="Consolas" panose="020B0609020204030204" pitchFamily="49" charset="0"/>
               </a:rPr>
             </a:br>
+            <a:r>
+              <a:rPr lang="de-DE" altLang="de-DE" sz="1600" dirty="0">
+                <a:solidFill>
+                  <a:srgbClr val="000000"/>
+                </a:solidFill>
+                <a:latin typeface="Consolas" panose="020B0609020204030204" pitchFamily="49" charset="0"/>
+                <a:cs typeface="Consolas" panose="020B0609020204030204" pitchFamily="49" charset="0"/>
+              </a:rPr>
+              <a:t/>
+            </a:r>
             <a:br>
               <a:rPr lang="de-DE" altLang="de-DE" sz="1600" dirty="0">
                 <a:solidFill>
@@ -14430,6 +14806,16 @@
                 <a:cs typeface="Consolas" panose="020B0609020204030204" pitchFamily="49" charset="0"/>
               </a:rPr>
             </a:br>
+            <a:r>
+              <a:rPr lang="de-DE" altLang="de-DE" sz="1600" dirty="0">
+                <a:solidFill>
+                  <a:srgbClr val="000000"/>
+                </a:solidFill>
+                <a:latin typeface="Consolas" panose="020B0609020204030204" pitchFamily="49" charset="0"/>
+                <a:cs typeface="Consolas" panose="020B0609020204030204" pitchFamily="49" charset="0"/>
+              </a:rPr>
+              <a:t/>
+            </a:r>
             <a:br>
               <a:rPr lang="de-DE" altLang="de-DE" sz="1600" dirty="0">
                 <a:solidFill>

</xml_diff>